<commit_message>
working on week 5 in-class exercises
</commit_message>
<xml_diff>
--- a/images/week_5_figures.pptx
+++ b/images/week_5_figures.pptx
@@ -6,6 +6,7 @@
   </p:sldMasterIdLst>
   <p:sldIdLst>
     <p:sldId id="256" r:id="rId2"/>
+    <p:sldId id="257" r:id="rId3"/>
   </p:sldIdLst>
   <p:sldSz cx="12192000" cy="6858000"/>
   <p:notesSz cx="6858000" cy="9144000"/>
@@ -104,6 +105,11 @@
       </a:defRPr>
     </a:lvl9pPr>
   </p:defaultTextStyle>
+  <p:extLst>
+    <p:ext uri="{EFAFB233-063F-42B5-8137-9DF3F51BA10A}">
+      <p15:sldGuideLst xmlns:p15="http://schemas.microsoft.com/office/powerpoint/2012/main"/>
+    </p:ext>
+  </p:extLst>
 </p:presentation>
 </file>
 
@@ -254,7 +260,7 @@
           <a:p>
             <a:fld id="{7B63D829-85BE-4A7F-BF7E-F3F71D446EA6}" type="datetimeFigureOut">
               <a:rPr lang="en-US" smtClean="0"/>
-              <a:t>10/7/2022</a:t>
+              <a:t>10/10/2022</a:t>
             </a:fld>
             <a:endParaRPr lang="en-US"/>
           </a:p>
@@ -452,7 +458,7 @@
           <a:p>
             <a:fld id="{7B63D829-85BE-4A7F-BF7E-F3F71D446EA6}" type="datetimeFigureOut">
               <a:rPr lang="en-US" smtClean="0"/>
-              <a:t>10/7/2022</a:t>
+              <a:t>10/10/2022</a:t>
             </a:fld>
             <a:endParaRPr lang="en-US"/>
           </a:p>
@@ -660,7 +666,7 @@
           <a:p>
             <a:fld id="{7B63D829-85BE-4A7F-BF7E-F3F71D446EA6}" type="datetimeFigureOut">
               <a:rPr lang="en-US" smtClean="0"/>
-              <a:t>10/7/2022</a:t>
+              <a:t>10/10/2022</a:t>
             </a:fld>
             <a:endParaRPr lang="en-US"/>
           </a:p>
@@ -858,7 +864,7 @@
           <a:p>
             <a:fld id="{7B63D829-85BE-4A7F-BF7E-F3F71D446EA6}" type="datetimeFigureOut">
               <a:rPr lang="en-US" smtClean="0"/>
-              <a:t>10/7/2022</a:t>
+              <a:t>10/10/2022</a:t>
             </a:fld>
             <a:endParaRPr lang="en-US"/>
           </a:p>
@@ -1133,7 +1139,7 @@
           <a:p>
             <a:fld id="{7B63D829-85BE-4A7F-BF7E-F3F71D446EA6}" type="datetimeFigureOut">
               <a:rPr lang="en-US" smtClean="0"/>
-              <a:t>10/7/2022</a:t>
+              <a:t>10/10/2022</a:t>
             </a:fld>
             <a:endParaRPr lang="en-US"/>
           </a:p>
@@ -1398,7 +1404,7 @@
           <a:p>
             <a:fld id="{7B63D829-85BE-4A7F-BF7E-F3F71D446EA6}" type="datetimeFigureOut">
               <a:rPr lang="en-US" smtClean="0"/>
-              <a:t>10/7/2022</a:t>
+              <a:t>10/10/2022</a:t>
             </a:fld>
             <a:endParaRPr lang="en-US"/>
           </a:p>
@@ -1810,7 +1816,7 @@
           <a:p>
             <a:fld id="{7B63D829-85BE-4A7F-BF7E-F3F71D446EA6}" type="datetimeFigureOut">
               <a:rPr lang="en-US" smtClean="0"/>
-              <a:t>10/7/2022</a:t>
+              <a:t>10/10/2022</a:t>
             </a:fld>
             <a:endParaRPr lang="en-US"/>
           </a:p>
@@ -1951,7 +1957,7 @@
           <a:p>
             <a:fld id="{7B63D829-85BE-4A7F-BF7E-F3F71D446EA6}" type="datetimeFigureOut">
               <a:rPr lang="en-US" smtClean="0"/>
-              <a:t>10/7/2022</a:t>
+              <a:t>10/10/2022</a:t>
             </a:fld>
             <a:endParaRPr lang="en-US"/>
           </a:p>
@@ -2064,7 +2070,7 @@
           <a:p>
             <a:fld id="{7B63D829-85BE-4A7F-BF7E-F3F71D446EA6}" type="datetimeFigureOut">
               <a:rPr lang="en-US" smtClean="0"/>
-              <a:t>10/7/2022</a:t>
+              <a:t>10/10/2022</a:t>
             </a:fld>
             <a:endParaRPr lang="en-US"/>
           </a:p>
@@ -2375,7 +2381,7 @@
           <a:p>
             <a:fld id="{7B63D829-85BE-4A7F-BF7E-F3F71D446EA6}" type="datetimeFigureOut">
               <a:rPr lang="en-US" smtClean="0"/>
-              <a:t>10/7/2022</a:t>
+              <a:t>10/10/2022</a:t>
             </a:fld>
             <a:endParaRPr lang="en-US"/>
           </a:p>
@@ -2663,7 +2669,7 @@
           <a:p>
             <a:fld id="{7B63D829-85BE-4A7F-BF7E-F3F71D446EA6}" type="datetimeFigureOut">
               <a:rPr lang="en-US" smtClean="0"/>
-              <a:t>10/7/2022</a:t>
+              <a:t>10/10/2022</a:t>
             </a:fld>
             <a:endParaRPr lang="en-US"/>
           </a:p>
@@ -2904,7 +2910,7 @@
           <a:p>
             <a:fld id="{7B63D829-85BE-4A7F-BF7E-F3F71D446EA6}" type="datetimeFigureOut">
               <a:rPr lang="en-US" smtClean="0"/>
-              <a:t>10/7/2022</a:t>
+              <a:t>10/10/2022</a:t>
             </a:fld>
             <a:endParaRPr lang="en-US"/>
           </a:p>
@@ -4590,6 +4596,1010 @@
 </p:sld>
 </file>
 
+<file path=ppt/slides/slide2.xml><?xml version="1.0" encoding="utf-8"?>
+<p:sld xmlns:a="http://schemas.openxmlformats.org/drawingml/2006/main" xmlns:r="http://schemas.openxmlformats.org/officeDocument/2006/relationships" xmlns:p="http://schemas.openxmlformats.org/presentationml/2006/main">
+  <p:cSld>
+    <p:spTree>
+      <p:nvGrpSpPr>
+        <p:cNvPr id="1" name=""/>
+        <p:cNvGrpSpPr/>
+        <p:nvPr/>
+      </p:nvGrpSpPr>
+      <p:grpSpPr>
+        <a:xfrm>
+          <a:off x="0" y="0"/>
+          <a:ext cx="0" cy="0"/>
+          <a:chOff x="0" y="0"/>
+          <a:chExt cx="0" cy="0"/>
+        </a:xfrm>
+      </p:grpSpPr>
+      <p:sp>
+        <p:nvSpPr>
+          <p:cNvPr id="4" name="Rectangle 3">
+            <a:extLst>
+              <a:ext uri="{FF2B5EF4-FFF2-40B4-BE49-F238E27FC236}">
+                <a16:creationId xmlns:a16="http://schemas.microsoft.com/office/drawing/2014/main" id="{A19FACF6-A8C6-4863-AFF5-135A78D32357}"/>
+              </a:ext>
+            </a:extLst>
+          </p:cNvPr>
+          <p:cNvSpPr/>
+          <p:nvPr/>
+        </p:nvSpPr>
+        <p:spPr>
+          <a:xfrm>
+            <a:off x="10334625" y="2709000"/>
+            <a:ext cx="1800000" cy="1440000"/>
+          </a:xfrm>
+          <a:prstGeom prst="rect">
+            <a:avLst/>
+          </a:prstGeom>
+          <a:solidFill>
+            <a:schemeClr val="bg1"/>
+          </a:solidFill>
+          <a:ln w="19050">
+            <a:solidFill>
+              <a:schemeClr val="tx1"/>
+            </a:solidFill>
+            <a:tailEnd type="triangle" w="lg" len="lg"/>
+          </a:ln>
+        </p:spPr>
+        <p:style>
+          <a:lnRef idx="2">
+            <a:schemeClr val="accent1">
+              <a:shade val="50000"/>
+            </a:schemeClr>
+          </a:lnRef>
+          <a:fillRef idx="1">
+            <a:schemeClr val="accent1"/>
+          </a:fillRef>
+          <a:effectRef idx="0">
+            <a:schemeClr val="accent1"/>
+          </a:effectRef>
+          <a:fontRef idx="minor">
+            <a:schemeClr val="lt1"/>
+          </a:fontRef>
+        </p:style>
+        <p:txBody>
+          <a:bodyPr rtlCol="0" anchor="ctr"/>
+          <a:lstStyle/>
+          <a:p>
+            <a:pPr algn="ctr"/>
+            <a:r>
+              <a:rPr lang="en-US" dirty="0">
+                <a:solidFill>
+                  <a:schemeClr val="tx1"/>
+                </a:solidFill>
+                <a:latin typeface="Verdana" panose="020B0604030504040204" pitchFamily="34" charset="0"/>
+                <a:ea typeface="Verdana" panose="020B0604030504040204" pitchFamily="34" charset="0"/>
+              </a:rPr>
+              <a:t>Self Esteem</a:t>
+            </a:r>
+          </a:p>
+          <a:p>
+            <a:pPr algn="ctr"/>
+            <a:r>
+              <a:rPr lang="en-US" i="1" dirty="0">
+                <a:solidFill>
+                  <a:schemeClr val="tx1"/>
+                </a:solidFill>
+                <a:latin typeface="Verdana" panose="020B0604030504040204" pitchFamily="34" charset="0"/>
+                <a:ea typeface="Verdana" panose="020B0604030504040204" pitchFamily="34" charset="0"/>
+              </a:rPr>
+              <a:t>Y</a:t>
+            </a:r>
+          </a:p>
+        </p:txBody>
+      </p:sp>
+      <p:sp>
+        <p:nvSpPr>
+          <p:cNvPr id="5" name="Rectangle 4">
+            <a:extLst>
+              <a:ext uri="{FF2B5EF4-FFF2-40B4-BE49-F238E27FC236}">
+                <a16:creationId xmlns:a16="http://schemas.microsoft.com/office/drawing/2014/main" id="{E19E62FC-F998-488D-8704-3CE4698BF983}"/>
+              </a:ext>
+            </a:extLst>
+          </p:cNvPr>
+          <p:cNvSpPr/>
+          <p:nvPr/>
+        </p:nvSpPr>
+        <p:spPr>
+          <a:xfrm>
+            <a:off x="6309970" y="5395073"/>
+            <a:ext cx="1800000" cy="1440000"/>
+          </a:xfrm>
+          <a:prstGeom prst="rect">
+            <a:avLst/>
+          </a:prstGeom>
+          <a:solidFill>
+            <a:schemeClr val="bg1"/>
+          </a:solidFill>
+          <a:ln w="19050">
+            <a:solidFill>
+              <a:schemeClr val="tx1"/>
+            </a:solidFill>
+            <a:tailEnd type="triangle" w="lg" len="lg"/>
+          </a:ln>
+        </p:spPr>
+        <p:style>
+          <a:lnRef idx="2">
+            <a:schemeClr val="accent1">
+              <a:shade val="50000"/>
+            </a:schemeClr>
+          </a:lnRef>
+          <a:fillRef idx="1">
+            <a:schemeClr val="accent1"/>
+          </a:fillRef>
+          <a:effectRef idx="0">
+            <a:schemeClr val="accent1"/>
+          </a:effectRef>
+          <a:fontRef idx="minor">
+            <a:schemeClr val="lt1"/>
+          </a:fontRef>
+        </p:style>
+        <p:txBody>
+          <a:bodyPr rtlCol="0" anchor="ctr"/>
+          <a:lstStyle/>
+          <a:p>
+            <a:pPr algn="ctr"/>
+            <a:r>
+              <a:rPr lang="en-US" dirty="0">
+                <a:solidFill>
+                  <a:schemeClr val="tx1"/>
+                </a:solidFill>
+                <a:latin typeface="Verdana" panose="020B0604030504040204" pitchFamily="34" charset="0"/>
+                <a:ea typeface="Verdana" panose="020B0604030504040204" pitchFamily="34" charset="0"/>
+              </a:rPr>
+              <a:t>Aggressive Behavior</a:t>
+            </a:r>
+          </a:p>
+          <a:p>
+            <a:pPr algn="ctr"/>
+            <a:r>
+              <a:rPr lang="en-US" i="1" dirty="0">
+                <a:solidFill>
+                  <a:schemeClr val="tx1"/>
+                </a:solidFill>
+                <a:latin typeface="Verdana" panose="020B0604030504040204" pitchFamily="34" charset="0"/>
+                <a:ea typeface="Verdana" panose="020B0604030504040204" pitchFamily="34" charset="0"/>
+              </a:rPr>
+              <a:t>M</a:t>
+            </a:r>
+            <a:r>
+              <a:rPr lang="en-US" baseline="-25000" dirty="0">
+                <a:solidFill>
+                  <a:schemeClr val="tx1"/>
+                </a:solidFill>
+                <a:latin typeface="Verdana" panose="020B0604030504040204" pitchFamily="34" charset="0"/>
+                <a:ea typeface="Verdana" panose="020B0604030504040204" pitchFamily="34" charset="0"/>
+              </a:rPr>
+              <a:t>22</a:t>
+            </a:r>
+            <a:endParaRPr lang="en-US" dirty="0">
+              <a:solidFill>
+                <a:schemeClr val="tx1"/>
+              </a:solidFill>
+              <a:latin typeface="Verdana" panose="020B0604030504040204" pitchFamily="34" charset="0"/>
+              <a:ea typeface="Verdana" panose="020B0604030504040204" pitchFamily="34" charset="0"/>
+            </a:endParaRPr>
+          </a:p>
+        </p:txBody>
+      </p:sp>
+      <p:sp>
+        <p:nvSpPr>
+          <p:cNvPr id="6" name="Rectangle 5">
+            <a:extLst>
+              <a:ext uri="{FF2B5EF4-FFF2-40B4-BE49-F238E27FC236}">
+                <a16:creationId xmlns:a16="http://schemas.microsoft.com/office/drawing/2014/main" id="{007A2B45-C776-43C7-9A89-929F98C93D40}"/>
+              </a:ext>
+            </a:extLst>
+          </p:cNvPr>
+          <p:cNvSpPr/>
+          <p:nvPr/>
+        </p:nvSpPr>
+        <p:spPr>
+          <a:xfrm>
+            <a:off x="4522671" y="2709000"/>
+            <a:ext cx="1800000" cy="1440000"/>
+          </a:xfrm>
+          <a:prstGeom prst="rect">
+            <a:avLst/>
+          </a:prstGeom>
+          <a:solidFill>
+            <a:schemeClr val="bg1"/>
+          </a:solidFill>
+          <a:ln w="19050">
+            <a:solidFill>
+              <a:schemeClr val="tx1"/>
+            </a:solidFill>
+            <a:tailEnd type="triangle" w="lg" len="lg"/>
+          </a:ln>
+        </p:spPr>
+        <p:style>
+          <a:lnRef idx="2">
+            <a:schemeClr val="accent1">
+              <a:shade val="50000"/>
+            </a:schemeClr>
+          </a:lnRef>
+          <a:fillRef idx="1">
+            <a:schemeClr val="accent1"/>
+          </a:fillRef>
+          <a:effectRef idx="0">
+            <a:schemeClr val="accent1"/>
+          </a:effectRef>
+          <a:fontRef idx="minor">
+            <a:schemeClr val="lt1"/>
+          </a:fontRef>
+        </p:style>
+        <p:txBody>
+          <a:bodyPr rtlCol="0" anchor="ctr"/>
+          <a:lstStyle/>
+          <a:p>
+            <a:pPr algn="ctr"/>
+            <a:r>
+              <a:rPr lang="en-US" dirty="0">
+                <a:solidFill>
+                  <a:schemeClr val="tx1"/>
+                </a:solidFill>
+                <a:latin typeface="Verdana" panose="020B0604030504040204" pitchFamily="34" charset="0"/>
+                <a:ea typeface="Verdana" panose="020B0604030504040204" pitchFamily="34" charset="0"/>
+              </a:rPr>
+              <a:t>Empathy</a:t>
+            </a:r>
+          </a:p>
+          <a:p>
+            <a:pPr algn="ctr"/>
+            <a:r>
+              <a:rPr lang="en-US" i="1" dirty="0">
+                <a:solidFill>
+                  <a:schemeClr val="tx1"/>
+                </a:solidFill>
+                <a:latin typeface="Verdana" panose="020B0604030504040204" pitchFamily="34" charset="0"/>
+                <a:ea typeface="Verdana" panose="020B0604030504040204" pitchFamily="34" charset="0"/>
+              </a:rPr>
+              <a:t>M</a:t>
+            </a:r>
+            <a:r>
+              <a:rPr lang="en-US" baseline="-25000" dirty="0">
+                <a:solidFill>
+                  <a:schemeClr val="tx1"/>
+                </a:solidFill>
+                <a:latin typeface="Verdana" panose="020B0604030504040204" pitchFamily="34" charset="0"/>
+                <a:ea typeface="Verdana" panose="020B0604030504040204" pitchFamily="34" charset="0"/>
+              </a:rPr>
+              <a:t>1</a:t>
+            </a:r>
+            <a:endParaRPr lang="en-US" dirty="0">
+              <a:solidFill>
+                <a:schemeClr val="tx1"/>
+              </a:solidFill>
+              <a:latin typeface="Verdana" panose="020B0604030504040204" pitchFamily="34" charset="0"/>
+              <a:ea typeface="Verdana" panose="020B0604030504040204" pitchFamily="34" charset="0"/>
+            </a:endParaRPr>
+          </a:p>
+        </p:txBody>
+      </p:sp>
+      <p:sp>
+        <p:nvSpPr>
+          <p:cNvPr id="7" name="Rectangle 6">
+            <a:extLst>
+              <a:ext uri="{FF2B5EF4-FFF2-40B4-BE49-F238E27FC236}">
+                <a16:creationId xmlns:a16="http://schemas.microsoft.com/office/drawing/2014/main" id="{52E951E4-41A2-46DC-9C26-2E1CCD8EEE08}"/>
+              </a:ext>
+            </a:extLst>
+          </p:cNvPr>
+          <p:cNvSpPr/>
+          <p:nvPr/>
+        </p:nvSpPr>
+        <p:spPr>
+          <a:xfrm>
+            <a:off x="6317350" y="15583"/>
+            <a:ext cx="1800000" cy="1440000"/>
+          </a:xfrm>
+          <a:prstGeom prst="rect">
+            <a:avLst/>
+          </a:prstGeom>
+          <a:solidFill>
+            <a:schemeClr val="bg1"/>
+          </a:solidFill>
+          <a:ln w="19050">
+            <a:solidFill>
+              <a:schemeClr val="tx1"/>
+            </a:solidFill>
+            <a:tailEnd type="triangle" w="lg" len="lg"/>
+          </a:ln>
+        </p:spPr>
+        <p:style>
+          <a:lnRef idx="2">
+            <a:schemeClr val="accent1">
+              <a:shade val="50000"/>
+            </a:schemeClr>
+          </a:lnRef>
+          <a:fillRef idx="1">
+            <a:schemeClr val="accent1"/>
+          </a:fillRef>
+          <a:effectRef idx="0">
+            <a:schemeClr val="accent1"/>
+          </a:effectRef>
+          <a:fontRef idx="minor">
+            <a:schemeClr val="lt1"/>
+          </a:fontRef>
+        </p:style>
+        <p:txBody>
+          <a:bodyPr rtlCol="0" anchor="ctr"/>
+          <a:lstStyle/>
+          <a:p>
+            <a:pPr algn="ctr"/>
+            <a:r>
+              <a:rPr lang="en-US" dirty="0">
+                <a:solidFill>
+                  <a:schemeClr val="tx1"/>
+                </a:solidFill>
+                <a:latin typeface="Verdana" panose="020B0604030504040204" pitchFamily="34" charset="0"/>
+                <a:ea typeface="Verdana" panose="020B0604030504040204" pitchFamily="34" charset="0"/>
+              </a:rPr>
+              <a:t>Prosocial Behavior</a:t>
+            </a:r>
+          </a:p>
+          <a:p>
+            <a:pPr algn="ctr"/>
+            <a:r>
+              <a:rPr lang="en-US" i="1" dirty="0">
+                <a:solidFill>
+                  <a:schemeClr val="tx1"/>
+                </a:solidFill>
+                <a:latin typeface="Verdana" panose="020B0604030504040204" pitchFamily="34" charset="0"/>
+                <a:ea typeface="Verdana" panose="020B0604030504040204" pitchFamily="34" charset="0"/>
+              </a:rPr>
+              <a:t>M</a:t>
+            </a:r>
+            <a:r>
+              <a:rPr lang="en-US" baseline="-25000" dirty="0">
+                <a:solidFill>
+                  <a:schemeClr val="tx1"/>
+                </a:solidFill>
+                <a:latin typeface="Verdana" panose="020B0604030504040204" pitchFamily="34" charset="0"/>
+                <a:ea typeface="Verdana" panose="020B0604030504040204" pitchFamily="34" charset="0"/>
+              </a:rPr>
+              <a:t>21</a:t>
+            </a:r>
+            <a:endParaRPr lang="en-US" dirty="0">
+              <a:solidFill>
+                <a:schemeClr val="tx1"/>
+              </a:solidFill>
+              <a:latin typeface="Verdana" panose="020B0604030504040204" pitchFamily="34" charset="0"/>
+              <a:ea typeface="Verdana" panose="020B0604030504040204" pitchFamily="34" charset="0"/>
+            </a:endParaRPr>
+          </a:p>
+        </p:txBody>
+      </p:sp>
+      <p:sp>
+        <p:nvSpPr>
+          <p:cNvPr id="8" name="Rectangle 7">
+            <a:extLst>
+              <a:ext uri="{FF2B5EF4-FFF2-40B4-BE49-F238E27FC236}">
+                <a16:creationId xmlns:a16="http://schemas.microsoft.com/office/drawing/2014/main" id="{18D60BD6-4506-42CA-9DF2-B18351A5721D}"/>
+              </a:ext>
+            </a:extLst>
+          </p:cNvPr>
+          <p:cNvSpPr/>
+          <p:nvPr/>
+        </p:nvSpPr>
+        <p:spPr>
+          <a:xfrm>
+            <a:off x="505396" y="1182292"/>
+            <a:ext cx="1800000" cy="1440000"/>
+          </a:xfrm>
+          <a:prstGeom prst="rect">
+            <a:avLst/>
+          </a:prstGeom>
+          <a:solidFill>
+            <a:schemeClr val="bg1"/>
+          </a:solidFill>
+          <a:ln w="19050">
+            <a:solidFill>
+              <a:schemeClr val="tx1"/>
+            </a:solidFill>
+            <a:tailEnd type="triangle" w="lg" len="lg"/>
+          </a:ln>
+        </p:spPr>
+        <p:style>
+          <a:lnRef idx="2">
+            <a:schemeClr val="accent1">
+              <a:shade val="50000"/>
+            </a:schemeClr>
+          </a:lnRef>
+          <a:fillRef idx="1">
+            <a:schemeClr val="accent1"/>
+          </a:fillRef>
+          <a:effectRef idx="0">
+            <a:schemeClr val="accent1"/>
+          </a:effectRef>
+          <a:fontRef idx="minor">
+            <a:schemeClr val="lt1"/>
+          </a:fontRef>
+        </p:style>
+        <p:txBody>
+          <a:bodyPr rtlCol="0" anchor="ctr"/>
+          <a:lstStyle/>
+          <a:p>
+            <a:pPr algn="ctr"/>
+            <a:r>
+              <a:rPr lang="en-US" dirty="0">
+                <a:solidFill>
+                  <a:schemeClr val="tx1"/>
+                </a:solidFill>
+                <a:latin typeface="Verdana" panose="020B0604030504040204" pitchFamily="34" charset="0"/>
+                <a:ea typeface="Verdana" panose="020B0604030504040204" pitchFamily="34" charset="0"/>
+              </a:rPr>
+              <a:t>Parent Attachment</a:t>
+            </a:r>
+          </a:p>
+          <a:p>
+            <a:pPr algn="ctr"/>
+            <a:r>
+              <a:rPr lang="en-US" i="1" dirty="0">
+                <a:solidFill>
+                  <a:schemeClr val="tx1"/>
+                </a:solidFill>
+                <a:latin typeface="Verdana" panose="020B0604030504040204" pitchFamily="34" charset="0"/>
+                <a:ea typeface="Verdana" panose="020B0604030504040204" pitchFamily="34" charset="0"/>
+              </a:rPr>
+              <a:t>X</a:t>
+            </a:r>
+            <a:r>
+              <a:rPr lang="en-US" baseline="-25000" dirty="0">
+                <a:solidFill>
+                  <a:schemeClr val="tx1"/>
+                </a:solidFill>
+                <a:latin typeface="Verdana" panose="020B0604030504040204" pitchFamily="34" charset="0"/>
+                <a:ea typeface="Verdana" panose="020B0604030504040204" pitchFamily="34" charset="0"/>
+              </a:rPr>
+              <a:t>1</a:t>
+            </a:r>
+            <a:endParaRPr lang="en-US" dirty="0">
+              <a:solidFill>
+                <a:schemeClr val="tx1"/>
+              </a:solidFill>
+              <a:latin typeface="Verdana" panose="020B0604030504040204" pitchFamily="34" charset="0"/>
+              <a:ea typeface="Verdana" panose="020B0604030504040204" pitchFamily="34" charset="0"/>
+            </a:endParaRPr>
+          </a:p>
+        </p:txBody>
+      </p:sp>
+      <p:sp>
+        <p:nvSpPr>
+          <p:cNvPr id="9" name="Rectangle 8">
+            <a:extLst>
+              <a:ext uri="{FF2B5EF4-FFF2-40B4-BE49-F238E27FC236}">
+                <a16:creationId xmlns:a16="http://schemas.microsoft.com/office/drawing/2014/main" id="{083A3182-37CC-4D74-8A5F-FC1615868D72}"/>
+              </a:ext>
+            </a:extLst>
+          </p:cNvPr>
+          <p:cNvSpPr/>
+          <p:nvPr/>
+        </p:nvSpPr>
+        <p:spPr>
+          <a:xfrm>
+            <a:off x="505396" y="4235709"/>
+            <a:ext cx="1800000" cy="1440000"/>
+          </a:xfrm>
+          <a:prstGeom prst="rect">
+            <a:avLst/>
+          </a:prstGeom>
+          <a:solidFill>
+            <a:schemeClr val="bg1"/>
+          </a:solidFill>
+          <a:ln w="19050">
+            <a:solidFill>
+              <a:schemeClr val="tx1"/>
+            </a:solidFill>
+            <a:tailEnd type="triangle" w="lg" len="lg"/>
+          </a:ln>
+        </p:spPr>
+        <p:style>
+          <a:lnRef idx="2">
+            <a:schemeClr val="accent1">
+              <a:shade val="50000"/>
+            </a:schemeClr>
+          </a:lnRef>
+          <a:fillRef idx="1">
+            <a:schemeClr val="accent1"/>
+          </a:fillRef>
+          <a:effectRef idx="0">
+            <a:schemeClr val="accent1"/>
+          </a:effectRef>
+          <a:fontRef idx="minor">
+            <a:schemeClr val="lt1"/>
+          </a:fontRef>
+        </p:style>
+        <p:txBody>
+          <a:bodyPr rtlCol="0" anchor="ctr"/>
+          <a:lstStyle/>
+          <a:p>
+            <a:pPr algn="ctr"/>
+            <a:r>
+              <a:rPr lang="en-US" dirty="0">
+                <a:solidFill>
+                  <a:schemeClr val="tx1"/>
+                </a:solidFill>
+                <a:latin typeface="Verdana" panose="020B0604030504040204" pitchFamily="34" charset="0"/>
+                <a:ea typeface="Verdana" panose="020B0604030504040204" pitchFamily="34" charset="0"/>
+              </a:rPr>
+              <a:t>Peer Attachment</a:t>
+            </a:r>
+          </a:p>
+          <a:p>
+            <a:pPr algn="ctr"/>
+            <a:r>
+              <a:rPr lang="en-US" i="1" dirty="0">
+                <a:solidFill>
+                  <a:schemeClr val="tx1"/>
+                </a:solidFill>
+                <a:latin typeface="Verdana" panose="020B0604030504040204" pitchFamily="34" charset="0"/>
+                <a:ea typeface="Verdana" panose="020B0604030504040204" pitchFamily="34" charset="0"/>
+              </a:rPr>
+              <a:t>X</a:t>
+            </a:r>
+            <a:r>
+              <a:rPr lang="en-US" baseline="-25000" dirty="0">
+                <a:solidFill>
+                  <a:schemeClr val="tx1"/>
+                </a:solidFill>
+                <a:latin typeface="Verdana" panose="020B0604030504040204" pitchFamily="34" charset="0"/>
+                <a:ea typeface="Verdana" panose="020B0604030504040204" pitchFamily="34" charset="0"/>
+              </a:rPr>
+              <a:t>2</a:t>
+            </a:r>
+            <a:endParaRPr lang="en-US" dirty="0">
+              <a:solidFill>
+                <a:schemeClr val="tx1"/>
+              </a:solidFill>
+              <a:latin typeface="Verdana" panose="020B0604030504040204" pitchFamily="34" charset="0"/>
+              <a:ea typeface="Verdana" panose="020B0604030504040204" pitchFamily="34" charset="0"/>
+            </a:endParaRPr>
+          </a:p>
+        </p:txBody>
+      </p:sp>
+      <p:cxnSp>
+        <p:nvCxnSpPr>
+          <p:cNvPr id="13" name="Straight Arrow Connector 12">
+            <a:extLst>
+              <a:ext uri="{FF2B5EF4-FFF2-40B4-BE49-F238E27FC236}">
+                <a16:creationId xmlns:a16="http://schemas.microsoft.com/office/drawing/2014/main" id="{92E69FA4-168A-4CEB-8DAD-71FFEDC8A974}"/>
+              </a:ext>
+            </a:extLst>
+          </p:cNvPr>
+          <p:cNvCxnSpPr>
+            <a:cxnSpLocks/>
+            <a:stCxn id="9" idx="3"/>
+            <a:endCxn id="6" idx="1"/>
+          </p:cNvCxnSpPr>
+          <p:nvPr/>
+        </p:nvCxnSpPr>
+        <p:spPr>
+          <a:xfrm flipV="1">
+            <a:off x="2305396" y="3429000"/>
+            <a:ext cx="2217275" cy="1526709"/>
+          </a:xfrm>
+          <a:prstGeom prst="straightConnector1">
+            <a:avLst/>
+          </a:prstGeom>
+          <a:ln w="19050">
+            <a:solidFill>
+              <a:schemeClr val="tx1"/>
+            </a:solidFill>
+            <a:headEnd type="none" w="med" len="med"/>
+            <a:tailEnd type="triangle" w="lg" len="lg"/>
+          </a:ln>
+        </p:spPr>
+        <p:style>
+          <a:lnRef idx="1">
+            <a:schemeClr val="accent1"/>
+          </a:lnRef>
+          <a:fillRef idx="0">
+            <a:schemeClr val="accent1"/>
+          </a:fillRef>
+          <a:effectRef idx="0">
+            <a:schemeClr val="accent1"/>
+          </a:effectRef>
+          <a:fontRef idx="minor">
+            <a:schemeClr val="tx1"/>
+          </a:fontRef>
+        </p:style>
+      </p:cxnSp>
+      <p:cxnSp>
+        <p:nvCxnSpPr>
+          <p:cNvPr id="25" name="Straight Arrow Connector 24">
+            <a:extLst>
+              <a:ext uri="{FF2B5EF4-FFF2-40B4-BE49-F238E27FC236}">
+                <a16:creationId xmlns:a16="http://schemas.microsoft.com/office/drawing/2014/main" id="{909472D3-22C8-4B7C-8F16-915F8F70BCBD}"/>
+              </a:ext>
+            </a:extLst>
+          </p:cNvPr>
+          <p:cNvCxnSpPr>
+            <a:cxnSpLocks/>
+            <a:stCxn id="6" idx="3"/>
+            <a:endCxn id="7" idx="2"/>
+          </p:cNvCxnSpPr>
+          <p:nvPr/>
+        </p:nvCxnSpPr>
+        <p:spPr>
+          <a:xfrm flipV="1">
+            <a:off x="6322671" y="1455583"/>
+            <a:ext cx="894679" cy="1973417"/>
+          </a:xfrm>
+          <a:prstGeom prst="straightConnector1">
+            <a:avLst/>
+          </a:prstGeom>
+          <a:ln w="19050">
+            <a:solidFill>
+              <a:schemeClr val="tx1"/>
+            </a:solidFill>
+            <a:headEnd type="none" w="med" len="med"/>
+            <a:tailEnd type="triangle" w="lg" len="lg"/>
+          </a:ln>
+        </p:spPr>
+        <p:style>
+          <a:lnRef idx="1">
+            <a:schemeClr val="accent1"/>
+          </a:lnRef>
+          <a:fillRef idx="0">
+            <a:schemeClr val="accent1"/>
+          </a:fillRef>
+          <a:effectRef idx="0">
+            <a:schemeClr val="accent1"/>
+          </a:effectRef>
+          <a:fontRef idx="minor">
+            <a:schemeClr val="tx1"/>
+          </a:fontRef>
+        </p:style>
+      </p:cxnSp>
+      <p:cxnSp>
+        <p:nvCxnSpPr>
+          <p:cNvPr id="28" name="Straight Arrow Connector 27">
+            <a:extLst>
+              <a:ext uri="{FF2B5EF4-FFF2-40B4-BE49-F238E27FC236}">
+                <a16:creationId xmlns:a16="http://schemas.microsoft.com/office/drawing/2014/main" id="{909F1749-6463-457B-9CAB-AC2F2FD88788}"/>
+              </a:ext>
+            </a:extLst>
+          </p:cNvPr>
+          <p:cNvCxnSpPr>
+            <a:cxnSpLocks/>
+            <a:stCxn id="6" idx="3"/>
+            <a:endCxn id="5" idx="0"/>
+          </p:cNvCxnSpPr>
+          <p:nvPr/>
+        </p:nvCxnSpPr>
+        <p:spPr>
+          <a:xfrm>
+            <a:off x="6322671" y="3429000"/>
+            <a:ext cx="887299" cy="1966073"/>
+          </a:xfrm>
+          <a:prstGeom prst="straightConnector1">
+            <a:avLst/>
+          </a:prstGeom>
+          <a:ln w="19050">
+            <a:solidFill>
+              <a:schemeClr val="tx1"/>
+            </a:solidFill>
+            <a:headEnd type="none" w="med" len="med"/>
+            <a:tailEnd type="triangle" w="lg" len="lg"/>
+          </a:ln>
+        </p:spPr>
+        <p:style>
+          <a:lnRef idx="1">
+            <a:schemeClr val="accent1"/>
+          </a:lnRef>
+          <a:fillRef idx="0">
+            <a:schemeClr val="accent1"/>
+          </a:fillRef>
+          <a:effectRef idx="0">
+            <a:schemeClr val="accent1"/>
+          </a:effectRef>
+          <a:fontRef idx="minor">
+            <a:schemeClr val="tx1"/>
+          </a:fontRef>
+        </p:style>
+      </p:cxnSp>
+      <p:cxnSp>
+        <p:nvCxnSpPr>
+          <p:cNvPr id="31" name="Straight Arrow Connector 30">
+            <a:extLst>
+              <a:ext uri="{FF2B5EF4-FFF2-40B4-BE49-F238E27FC236}">
+                <a16:creationId xmlns:a16="http://schemas.microsoft.com/office/drawing/2014/main" id="{294E8FF9-DAE3-4BDA-911F-1FE63E1FD5CD}"/>
+              </a:ext>
+            </a:extLst>
+          </p:cNvPr>
+          <p:cNvCxnSpPr>
+            <a:cxnSpLocks/>
+            <a:stCxn id="7" idx="2"/>
+            <a:endCxn id="4" idx="1"/>
+          </p:cNvCxnSpPr>
+          <p:nvPr/>
+        </p:nvCxnSpPr>
+        <p:spPr>
+          <a:xfrm>
+            <a:off x="7217350" y="1455583"/>
+            <a:ext cx="3117275" cy="1973417"/>
+          </a:xfrm>
+          <a:prstGeom prst="straightConnector1">
+            <a:avLst/>
+          </a:prstGeom>
+          <a:ln w="19050">
+            <a:solidFill>
+              <a:schemeClr val="tx1"/>
+            </a:solidFill>
+            <a:headEnd type="none" w="med" len="med"/>
+            <a:tailEnd type="triangle" w="lg" len="lg"/>
+          </a:ln>
+        </p:spPr>
+        <p:style>
+          <a:lnRef idx="1">
+            <a:schemeClr val="accent1"/>
+          </a:lnRef>
+          <a:fillRef idx="0">
+            <a:schemeClr val="accent1"/>
+          </a:fillRef>
+          <a:effectRef idx="0">
+            <a:schemeClr val="accent1"/>
+          </a:effectRef>
+          <a:fontRef idx="minor">
+            <a:schemeClr val="tx1"/>
+          </a:fontRef>
+        </p:style>
+      </p:cxnSp>
+      <p:cxnSp>
+        <p:nvCxnSpPr>
+          <p:cNvPr id="34" name="Straight Arrow Connector 33">
+            <a:extLst>
+              <a:ext uri="{FF2B5EF4-FFF2-40B4-BE49-F238E27FC236}">
+                <a16:creationId xmlns:a16="http://schemas.microsoft.com/office/drawing/2014/main" id="{0430617C-9C6D-4CBC-989F-3ABFB3B93F66}"/>
+              </a:ext>
+            </a:extLst>
+          </p:cNvPr>
+          <p:cNvCxnSpPr>
+            <a:cxnSpLocks/>
+            <a:stCxn id="5" idx="0"/>
+            <a:endCxn id="4" idx="1"/>
+          </p:cNvCxnSpPr>
+          <p:nvPr/>
+        </p:nvCxnSpPr>
+        <p:spPr>
+          <a:xfrm flipV="1">
+            <a:off x="7209970" y="3429000"/>
+            <a:ext cx="3124655" cy="1966073"/>
+          </a:xfrm>
+          <a:prstGeom prst="straightConnector1">
+            <a:avLst/>
+          </a:prstGeom>
+          <a:ln w="19050">
+            <a:solidFill>
+              <a:schemeClr val="tx1"/>
+            </a:solidFill>
+            <a:headEnd type="none" w="med" len="med"/>
+            <a:tailEnd type="triangle" w="lg" len="lg"/>
+          </a:ln>
+        </p:spPr>
+        <p:style>
+          <a:lnRef idx="1">
+            <a:schemeClr val="accent1"/>
+          </a:lnRef>
+          <a:fillRef idx="0">
+            <a:schemeClr val="accent1"/>
+          </a:fillRef>
+          <a:effectRef idx="0">
+            <a:schemeClr val="accent1"/>
+          </a:effectRef>
+          <a:fontRef idx="minor">
+            <a:schemeClr val="tx1"/>
+          </a:fontRef>
+        </p:style>
+      </p:cxnSp>
+      <p:cxnSp>
+        <p:nvCxnSpPr>
+          <p:cNvPr id="44" name="Straight Arrow Connector 43">
+            <a:extLst>
+              <a:ext uri="{FF2B5EF4-FFF2-40B4-BE49-F238E27FC236}">
+                <a16:creationId xmlns:a16="http://schemas.microsoft.com/office/drawing/2014/main" id="{91CA7169-5F05-4153-8C29-A6D964804223}"/>
+              </a:ext>
+            </a:extLst>
+          </p:cNvPr>
+          <p:cNvCxnSpPr>
+            <a:cxnSpLocks/>
+            <a:stCxn id="8" idx="3"/>
+            <a:endCxn id="4" idx="1"/>
+          </p:cNvCxnSpPr>
+          <p:nvPr/>
+        </p:nvCxnSpPr>
+        <p:spPr>
+          <a:xfrm>
+            <a:off x="2305396" y="1902292"/>
+            <a:ext cx="8029229" cy="1526708"/>
+          </a:xfrm>
+          <a:prstGeom prst="straightConnector1">
+            <a:avLst/>
+          </a:prstGeom>
+          <a:ln w="19050">
+            <a:solidFill>
+              <a:schemeClr val="tx1"/>
+            </a:solidFill>
+            <a:headEnd type="none" w="med" len="med"/>
+            <a:tailEnd type="triangle" w="lg" len="lg"/>
+          </a:ln>
+        </p:spPr>
+        <p:style>
+          <a:lnRef idx="1">
+            <a:schemeClr val="accent1"/>
+          </a:lnRef>
+          <a:fillRef idx="0">
+            <a:schemeClr val="accent1"/>
+          </a:fillRef>
+          <a:effectRef idx="0">
+            <a:schemeClr val="accent1"/>
+          </a:effectRef>
+          <a:fontRef idx="minor">
+            <a:schemeClr val="tx1"/>
+          </a:fontRef>
+        </p:style>
+      </p:cxnSp>
+      <p:cxnSp>
+        <p:nvCxnSpPr>
+          <p:cNvPr id="80" name="Straight Arrow Connector 79">
+            <a:extLst>
+              <a:ext uri="{FF2B5EF4-FFF2-40B4-BE49-F238E27FC236}">
+                <a16:creationId xmlns:a16="http://schemas.microsoft.com/office/drawing/2014/main" id="{F558EF7D-F84C-4C32-9C4E-BAA6A7F97F5F}"/>
+              </a:ext>
+            </a:extLst>
+          </p:cNvPr>
+          <p:cNvCxnSpPr>
+            <a:cxnSpLocks/>
+            <a:stCxn id="9" idx="3"/>
+            <a:endCxn id="7" idx="1"/>
+          </p:cNvCxnSpPr>
+          <p:nvPr/>
+        </p:nvCxnSpPr>
+        <p:spPr>
+          <a:xfrm flipV="1">
+            <a:off x="2305396" y="735583"/>
+            <a:ext cx="4011954" cy="4220126"/>
+          </a:xfrm>
+          <a:prstGeom prst="straightConnector1">
+            <a:avLst/>
+          </a:prstGeom>
+          <a:ln w="19050">
+            <a:solidFill>
+              <a:schemeClr val="tx1"/>
+            </a:solidFill>
+            <a:headEnd type="none" w="med" len="med"/>
+            <a:tailEnd type="triangle" w="lg" len="lg"/>
+          </a:ln>
+        </p:spPr>
+        <p:style>
+          <a:lnRef idx="1">
+            <a:schemeClr val="accent1"/>
+          </a:lnRef>
+          <a:fillRef idx="0">
+            <a:schemeClr val="accent1"/>
+          </a:fillRef>
+          <a:effectRef idx="0">
+            <a:schemeClr val="accent1"/>
+          </a:effectRef>
+          <a:fontRef idx="minor">
+            <a:schemeClr val="tx1"/>
+          </a:fontRef>
+        </p:style>
+      </p:cxnSp>
+      <p:cxnSp>
+        <p:nvCxnSpPr>
+          <p:cNvPr id="98" name="Connector: Curved 97">
+            <a:extLst>
+              <a:ext uri="{FF2B5EF4-FFF2-40B4-BE49-F238E27FC236}">
+                <a16:creationId xmlns:a16="http://schemas.microsoft.com/office/drawing/2014/main" id="{90F35EA7-9F80-471F-A883-8010CFB12B99}"/>
+              </a:ext>
+            </a:extLst>
+          </p:cNvPr>
+          <p:cNvCxnSpPr>
+            <a:cxnSpLocks/>
+            <a:stCxn id="8" idx="1"/>
+            <a:endCxn id="9" idx="1"/>
+          </p:cNvCxnSpPr>
+          <p:nvPr/>
+        </p:nvCxnSpPr>
+        <p:spPr>
+          <a:xfrm rot="10800000" flipV="1">
+            <a:off x="505396" y="1902291"/>
+            <a:ext cx="12700" cy="3053417"/>
+          </a:xfrm>
+          <a:prstGeom prst="curvedConnector3">
+            <a:avLst>
+              <a:gd name="adj1" fmla="val 3600000"/>
+            </a:avLst>
+          </a:prstGeom>
+          <a:ln w="19050">
+            <a:solidFill>
+              <a:schemeClr val="tx1"/>
+            </a:solidFill>
+            <a:headEnd type="triangle" w="lg" len="lg"/>
+            <a:tailEnd type="triangle" w="lg" len="lg"/>
+          </a:ln>
+        </p:spPr>
+        <p:style>
+          <a:lnRef idx="1">
+            <a:schemeClr val="accent1"/>
+          </a:lnRef>
+          <a:fillRef idx="0">
+            <a:schemeClr val="accent1"/>
+          </a:fillRef>
+          <a:effectRef idx="0">
+            <a:schemeClr val="accent1"/>
+          </a:effectRef>
+          <a:fontRef idx="minor">
+            <a:schemeClr val="tx1"/>
+          </a:fontRef>
+        </p:style>
+      </p:cxnSp>
+      <p:cxnSp>
+        <p:nvCxnSpPr>
+          <p:cNvPr id="102" name="Connector: Curved 101">
+            <a:extLst>
+              <a:ext uri="{FF2B5EF4-FFF2-40B4-BE49-F238E27FC236}">
+                <a16:creationId xmlns:a16="http://schemas.microsoft.com/office/drawing/2014/main" id="{A1D57974-5D5D-4C9D-8E55-5216371483D3}"/>
+              </a:ext>
+            </a:extLst>
+          </p:cNvPr>
+          <p:cNvCxnSpPr>
+            <a:cxnSpLocks/>
+            <a:stCxn id="7" idx="3"/>
+            <a:endCxn id="5" idx="3"/>
+          </p:cNvCxnSpPr>
+          <p:nvPr/>
+        </p:nvCxnSpPr>
+        <p:spPr>
+          <a:xfrm flipH="1">
+            <a:off x="8109970" y="735583"/>
+            <a:ext cx="7380" cy="5379490"/>
+          </a:xfrm>
+          <a:prstGeom prst="curvedConnector3">
+            <a:avLst>
+              <a:gd name="adj1" fmla="val -14415569"/>
+            </a:avLst>
+          </a:prstGeom>
+          <a:ln w="19050">
+            <a:solidFill>
+              <a:schemeClr val="tx1"/>
+            </a:solidFill>
+            <a:headEnd type="triangle" w="lg" len="lg"/>
+            <a:tailEnd type="triangle" w="lg" len="lg"/>
+          </a:ln>
+        </p:spPr>
+        <p:style>
+          <a:lnRef idx="1">
+            <a:schemeClr val="accent1"/>
+          </a:lnRef>
+          <a:fillRef idx="0">
+            <a:schemeClr val="accent1"/>
+          </a:fillRef>
+          <a:effectRef idx="0">
+            <a:schemeClr val="accent1"/>
+          </a:effectRef>
+          <a:fontRef idx="minor">
+            <a:schemeClr val="tx1"/>
+          </a:fontRef>
+        </p:style>
+      </p:cxnSp>
+    </p:spTree>
+    <p:extLst>
+      <p:ext uri="{BB962C8B-B14F-4D97-AF65-F5344CB8AC3E}">
+        <p14:creationId xmlns:p14="http://schemas.microsoft.com/office/powerpoint/2010/main" val="1794803534"/>
+      </p:ext>
+    </p:extLst>
+  </p:cSld>
+  <p:clrMapOvr>
+    <a:masterClrMapping/>
+  </p:clrMapOvr>
+</p:sld>
+</file>
+
 <file path=ppt/theme/theme1.xml><?xml version="1.0" encoding="utf-8"?>
 <a:theme xmlns:a="http://schemas.openxmlformats.org/drawingml/2006/main" name="Office Theme">
   <a:themeElements>

</xml_diff>

<commit_message>
removing an erroneous path from the restricted model's path diagram in the week 5 in-class exercises
</commit_message>
<xml_diff>
--- a/images/week_5_figures.pptx
+++ b/images/week_5_figures.pptx
@@ -260,7 +260,7 @@
           <a:p>
             <a:fld id="{7B63D829-85BE-4A7F-BF7E-F3F71D446EA6}" type="datetimeFigureOut">
               <a:rPr lang="en-US" smtClean="0"/>
-              <a:t>10/10/2022</a:t>
+              <a:t>10/11/2022</a:t>
             </a:fld>
             <a:endParaRPr lang="en-US"/>
           </a:p>
@@ -458,7 +458,7 @@
           <a:p>
             <a:fld id="{7B63D829-85BE-4A7F-BF7E-F3F71D446EA6}" type="datetimeFigureOut">
               <a:rPr lang="en-US" smtClean="0"/>
-              <a:t>10/10/2022</a:t>
+              <a:t>10/11/2022</a:t>
             </a:fld>
             <a:endParaRPr lang="en-US"/>
           </a:p>
@@ -666,7 +666,7 @@
           <a:p>
             <a:fld id="{7B63D829-85BE-4A7F-BF7E-F3F71D446EA6}" type="datetimeFigureOut">
               <a:rPr lang="en-US" smtClean="0"/>
-              <a:t>10/10/2022</a:t>
+              <a:t>10/11/2022</a:t>
             </a:fld>
             <a:endParaRPr lang="en-US"/>
           </a:p>
@@ -864,7 +864,7 @@
           <a:p>
             <a:fld id="{7B63D829-85BE-4A7F-BF7E-F3F71D446EA6}" type="datetimeFigureOut">
               <a:rPr lang="en-US" smtClean="0"/>
-              <a:t>10/10/2022</a:t>
+              <a:t>10/11/2022</a:t>
             </a:fld>
             <a:endParaRPr lang="en-US"/>
           </a:p>
@@ -1139,7 +1139,7 @@
           <a:p>
             <a:fld id="{7B63D829-85BE-4A7F-BF7E-F3F71D446EA6}" type="datetimeFigureOut">
               <a:rPr lang="en-US" smtClean="0"/>
-              <a:t>10/10/2022</a:t>
+              <a:t>10/11/2022</a:t>
             </a:fld>
             <a:endParaRPr lang="en-US"/>
           </a:p>
@@ -1404,7 +1404,7 @@
           <a:p>
             <a:fld id="{7B63D829-85BE-4A7F-BF7E-F3F71D446EA6}" type="datetimeFigureOut">
               <a:rPr lang="en-US" smtClean="0"/>
-              <a:t>10/10/2022</a:t>
+              <a:t>10/11/2022</a:t>
             </a:fld>
             <a:endParaRPr lang="en-US"/>
           </a:p>
@@ -1816,7 +1816,7 @@
           <a:p>
             <a:fld id="{7B63D829-85BE-4A7F-BF7E-F3F71D446EA6}" type="datetimeFigureOut">
               <a:rPr lang="en-US" smtClean="0"/>
-              <a:t>10/10/2022</a:t>
+              <a:t>10/11/2022</a:t>
             </a:fld>
             <a:endParaRPr lang="en-US"/>
           </a:p>
@@ -1957,7 +1957,7 @@
           <a:p>
             <a:fld id="{7B63D829-85BE-4A7F-BF7E-F3F71D446EA6}" type="datetimeFigureOut">
               <a:rPr lang="en-US" smtClean="0"/>
-              <a:t>10/10/2022</a:t>
+              <a:t>10/11/2022</a:t>
             </a:fld>
             <a:endParaRPr lang="en-US"/>
           </a:p>
@@ -2070,7 +2070,7 @@
           <a:p>
             <a:fld id="{7B63D829-85BE-4A7F-BF7E-F3F71D446EA6}" type="datetimeFigureOut">
               <a:rPr lang="en-US" smtClean="0"/>
-              <a:t>10/10/2022</a:t>
+              <a:t>10/11/2022</a:t>
             </a:fld>
             <a:endParaRPr lang="en-US"/>
           </a:p>
@@ -2381,7 +2381,7 @@
           <a:p>
             <a:fld id="{7B63D829-85BE-4A7F-BF7E-F3F71D446EA6}" type="datetimeFigureOut">
               <a:rPr lang="en-US" smtClean="0"/>
-              <a:t>10/10/2022</a:t>
+              <a:t>10/11/2022</a:t>
             </a:fld>
             <a:endParaRPr lang="en-US"/>
           </a:p>
@@ -2669,7 +2669,7 @@
           <a:p>
             <a:fld id="{7B63D829-85BE-4A7F-BF7E-F3F71D446EA6}" type="datetimeFigureOut">
               <a:rPr lang="en-US" smtClean="0"/>
-              <a:t>10/10/2022</a:t>
+              <a:t>10/11/2022</a:t>
             </a:fld>
             <a:endParaRPr lang="en-US"/>
           </a:p>
@@ -2910,7 +2910,7 @@
           <a:p>
             <a:fld id="{7B63D829-85BE-4A7F-BF7E-F3F71D446EA6}" type="datetimeFigureOut">
               <a:rPr lang="en-US" smtClean="0"/>
-              <a:t>10/10/2022</a:t>
+              <a:t>10/11/2022</a:t>
             </a:fld>
             <a:endParaRPr lang="en-US"/>
           </a:p>
@@ -5444,53 +5444,6 @@
       </p:cxnSp>
       <p:cxnSp>
         <p:nvCxnSpPr>
-          <p:cNvPr id="80" name="Straight Arrow Connector 79">
-            <a:extLst>
-              <a:ext uri="{FF2B5EF4-FFF2-40B4-BE49-F238E27FC236}">
-                <a16:creationId xmlns:a16="http://schemas.microsoft.com/office/drawing/2014/main" id="{F558EF7D-F84C-4C32-9C4E-BAA6A7F97F5F}"/>
-              </a:ext>
-            </a:extLst>
-          </p:cNvPr>
-          <p:cNvCxnSpPr>
-            <a:cxnSpLocks/>
-            <a:stCxn id="9" idx="3"/>
-            <a:endCxn id="7" idx="1"/>
-          </p:cNvCxnSpPr>
-          <p:nvPr/>
-        </p:nvCxnSpPr>
-        <p:spPr>
-          <a:xfrm flipV="1">
-            <a:off x="2305396" y="735583"/>
-            <a:ext cx="4011954" cy="4220126"/>
-          </a:xfrm>
-          <a:prstGeom prst="straightConnector1">
-            <a:avLst/>
-          </a:prstGeom>
-          <a:ln w="19050">
-            <a:solidFill>
-              <a:schemeClr val="tx1"/>
-            </a:solidFill>
-            <a:headEnd type="none" w="med" len="med"/>
-            <a:tailEnd type="triangle" w="lg" len="lg"/>
-          </a:ln>
-        </p:spPr>
-        <p:style>
-          <a:lnRef idx="1">
-            <a:schemeClr val="accent1"/>
-          </a:lnRef>
-          <a:fillRef idx="0">
-            <a:schemeClr val="accent1"/>
-          </a:fillRef>
-          <a:effectRef idx="0">
-            <a:schemeClr val="accent1"/>
-          </a:effectRef>
-          <a:fontRef idx="minor">
-            <a:schemeClr val="tx1"/>
-          </a:fontRef>
-        </p:style>
-      </p:cxnSp>
-      <p:cxnSp>
-        <p:nvCxnSpPr>
           <p:cNvPr id="98" name="Connector: Curved 97">
             <a:extLst>
               <a:ext uri="{FF2B5EF4-FFF2-40B4-BE49-F238E27FC236}">

</xml_diff>